<commit_message>
post: avisor: add freertos
</commit_message>
<xml_diff>
--- a/assets/images/20230225-aVisor/aVisor.pptx
+++ b/assets/images/20230225-aVisor/aVisor.pptx
@@ -104,6 +104,11 @@
       </a:defRPr>
     </a:lvl9pPr>
   </p:defaultTextStyle>
+  <p:extLst>
+    <p:ext uri="{EFAFB233-063F-42B5-8137-9DF3F51BA10A}">
+      <p15:sldGuideLst xmlns:p15="http://schemas.microsoft.com/office/powerpoint/2012/main"/>
+    </p:ext>
+  </p:extLst>
 </p:presentation>
 </file>
 
@@ -254,7 +259,7 @@
           <a:p>
             <a:fld id="{9576CA61-0AAF-43A2-BB74-BDE3C85357C2}" type="datetimeFigureOut">
               <a:rPr lang="zh-CN" altLang="en-US" smtClean="0"/>
-              <a:t>2023/2/25</a:t>
+              <a:t>2023/5/29</a:t>
             </a:fld>
             <a:endParaRPr lang="zh-CN" altLang="en-US"/>
           </a:p>
@@ -452,7 +457,7 @@
           <a:p>
             <a:fld id="{9576CA61-0AAF-43A2-BB74-BDE3C85357C2}" type="datetimeFigureOut">
               <a:rPr lang="zh-CN" altLang="en-US" smtClean="0"/>
-              <a:t>2023/2/25</a:t>
+              <a:t>2023/5/29</a:t>
             </a:fld>
             <a:endParaRPr lang="zh-CN" altLang="en-US"/>
           </a:p>
@@ -660,7 +665,7 @@
           <a:p>
             <a:fld id="{9576CA61-0AAF-43A2-BB74-BDE3C85357C2}" type="datetimeFigureOut">
               <a:rPr lang="zh-CN" altLang="en-US" smtClean="0"/>
-              <a:t>2023/2/25</a:t>
+              <a:t>2023/5/29</a:t>
             </a:fld>
             <a:endParaRPr lang="zh-CN" altLang="en-US"/>
           </a:p>
@@ -858,7 +863,7 @@
           <a:p>
             <a:fld id="{9576CA61-0AAF-43A2-BB74-BDE3C85357C2}" type="datetimeFigureOut">
               <a:rPr lang="zh-CN" altLang="en-US" smtClean="0"/>
-              <a:t>2023/2/25</a:t>
+              <a:t>2023/5/29</a:t>
             </a:fld>
             <a:endParaRPr lang="zh-CN" altLang="en-US"/>
           </a:p>
@@ -1133,7 +1138,7 @@
           <a:p>
             <a:fld id="{9576CA61-0AAF-43A2-BB74-BDE3C85357C2}" type="datetimeFigureOut">
               <a:rPr lang="zh-CN" altLang="en-US" smtClean="0"/>
-              <a:t>2023/2/25</a:t>
+              <a:t>2023/5/29</a:t>
             </a:fld>
             <a:endParaRPr lang="zh-CN" altLang="en-US"/>
           </a:p>
@@ -1398,7 +1403,7 @@
           <a:p>
             <a:fld id="{9576CA61-0AAF-43A2-BB74-BDE3C85357C2}" type="datetimeFigureOut">
               <a:rPr lang="zh-CN" altLang="en-US" smtClean="0"/>
-              <a:t>2023/2/25</a:t>
+              <a:t>2023/5/29</a:t>
             </a:fld>
             <a:endParaRPr lang="zh-CN" altLang="en-US"/>
           </a:p>
@@ -1810,7 +1815,7 @@
           <a:p>
             <a:fld id="{9576CA61-0AAF-43A2-BB74-BDE3C85357C2}" type="datetimeFigureOut">
               <a:rPr lang="zh-CN" altLang="en-US" smtClean="0"/>
-              <a:t>2023/2/25</a:t>
+              <a:t>2023/5/29</a:t>
             </a:fld>
             <a:endParaRPr lang="zh-CN" altLang="en-US"/>
           </a:p>
@@ -1951,7 +1956,7 @@
           <a:p>
             <a:fld id="{9576CA61-0AAF-43A2-BB74-BDE3C85357C2}" type="datetimeFigureOut">
               <a:rPr lang="zh-CN" altLang="en-US" smtClean="0"/>
-              <a:t>2023/2/25</a:t>
+              <a:t>2023/5/29</a:t>
             </a:fld>
             <a:endParaRPr lang="zh-CN" altLang="en-US"/>
           </a:p>
@@ -2064,7 +2069,7 @@
           <a:p>
             <a:fld id="{9576CA61-0AAF-43A2-BB74-BDE3C85357C2}" type="datetimeFigureOut">
               <a:rPr lang="zh-CN" altLang="en-US" smtClean="0"/>
-              <a:t>2023/2/25</a:t>
+              <a:t>2023/5/29</a:t>
             </a:fld>
             <a:endParaRPr lang="zh-CN" altLang="en-US"/>
           </a:p>
@@ -2375,7 +2380,7 @@
           <a:p>
             <a:fld id="{9576CA61-0AAF-43A2-BB74-BDE3C85357C2}" type="datetimeFigureOut">
               <a:rPr lang="zh-CN" altLang="en-US" smtClean="0"/>
-              <a:t>2023/2/25</a:t>
+              <a:t>2023/5/29</a:t>
             </a:fld>
             <a:endParaRPr lang="zh-CN" altLang="en-US"/>
           </a:p>
@@ -2663,7 +2668,7 @@
           <a:p>
             <a:fld id="{9576CA61-0AAF-43A2-BB74-BDE3C85357C2}" type="datetimeFigureOut">
               <a:rPr lang="zh-CN" altLang="en-US" smtClean="0"/>
-              <a:t>2023/2/25</a:t>
+              <a:t>2023/5/29</a:t>
             </a:fld>
             <a:endParaRPr lang="zh-CN" altLang="en-US"/>
           </a:p>
@@ -2904,7 +2909,7 @@
           <a:p>
             <a:fld id="{9576CA61-0AAF-43A2-BB74-BDE3C85357C2}" type="datetimeFigureOut">
               <a:rPr lang="zh-CN" altLang="en-US" smtClean="0"/>
-              <a:t>2023/2/25</a:t>
+              <a:t>2023/5/29</a:t>
             </a:fld>
             <a:endParaRPr lang="zh-CN" altLang="en-US"/>
           </a:p>
@@ -3323,10 +3328,10 @@
       </p:grpSpPr>
       <p:grpSp>
         <p:nvGrpSpPr>
-          <p:cNvPr id="9" name="组合 8">
-            <a:extLst>
-              <a:ext uri="{FF2B5EF4-FFF2-40B4-BE49-F238E27FC236}">
-                <a16:creationId xmlns:a16="http://schemas.microsoft.com/office/drawing/2014/main" id="{A9236B26-AEC5-D990-F3A8-85149AE19F3B}"/>
+          <p:cNvPr id="3" name="组合 2">
+            <a:extLst>
+              <a:ext uri="{FF2B5EF4-FFF2-40B4-BE49-F238E27FC236}">
+                <a16:creationId xmlns:a16="http://schemas.microsoft.com/office/drawing/2014/main" id="{154CA43F-784D-2565-53B1-242346E4B12C}"/>
               </a:ext>
             </a:extLst>
           </p:cNvPr>
@@ -3335,10 +3340,10 @@
         </p:nvGrpSpPr>
         <p:grpSpPr>
           <a:xfrm>
-            <a:off x="3982340" y="3428999"/>
-            <a:ext cx="2991028" cy="1442104"/>
-            <a:chOff x="3982340" y="3428999"/>
-            <a:chExt cx="2991028" cy="1442104"/>
+            <a:off x="3982339" y="3428998"/>
+            <a:ext cx="4281128" cy="1442105"/>
+            <a:chOff x="3982339" y="3428998"/>
+            <a:chExt cx="4281128" cy="1442105"/>
           </a:xfrm>
         </p:grpSpPr>
         <p:sp>
@@ -3356,7 +3361,7 @@
           <p:spPr>
             <a:xfrm>
               <a:off x="3982340" y="4546363"/>
-              <a:ext cx="2991028" cy="324740"/>
+              <a:ext cx="4281126" cy="324740"/>
             </a:xfrm>
             <a:prstGeom prst="rect">
               <a:avLst/>
@@ -3407,8 +3412,8 @@
           </p:nvSpPr>
           <p:spPr>
             <a:xfrm>
-              <a:off x="3982340" y="4153256"/>
-              <a:ext cx="2991028" cy="324740"/>
+              <a:off x="3982339" y="4153256"/>
+              <a:ext cx="4281127" cy="324740"/>
             </a:xfrm>
             <a:prstGeom prst="rect">
               <a:avLst/>
@@ -3601,6 +3606,61 @@
               <a:r>
                 <a:rPr lang="en-US" altLang="zh-CN" dirty="0" err="1"/>
                 <a:t>uboot</a:t>
+              </a:r>
+              <a:endParaRPr lang="zh-CN" altLang="en-US" dirty="0"/>
+            </a:p>
+          </p:txBody>
+        </p:sp>
+        <p:sp>
+          <p:nvSpPr>
+            <p:cNvPr id="2" name="矩形 1">
+              <a:extLst>
+                <a:ext uri="{FF2B5EF4-FFF2-40B4-BE49-F238E27FC236}">
+                  <a16:creationId xmlns:a16="http://schemas.microsoft.com/office/drawing/2014/main" id="{562045E8-2571-11E3-2BAD-DA3BBCE1C4CE}"/>
+                </a:ext>
+              </a:extLst>
+            </p:cNvPr>
+            <p:cNvSpPr/>
+            <p:nvPr/>
+          </p:nvSpPr>
+          <p:spPr>
+            <a:xfrm>
+              <a:off x="7084463" y="3428998"/>
+              <a:ext cx="1179004" cy="655889"/>
+            </a:xfrm>
+            <a:prstGeom prst="rect">
+              <a:avLst/>
+            </a:prstGeom>
+          </p:spPr>
+          <p:style>
+            <a:lnRef idx="1">
+              <a:schemeClr val="accent2"/>
+            </a:lnRef>
+            <a:fillRef idx="3">
+              <a:schemeClr val="accent2"/>
+            </a:fillRef>
+            <a:effectRef idx="2">
+              <a:schemeClr val="accent2"/>
+            </a:effectRef>
+            <a:fontRef idx="minor">
+              <a:schemeClr val="lt1"/>
+            </a:fontRef>
+          </p:style>
+          <p:txBody>
+            <a:bodyPr rtlCol="0" anchor="ctr"/>
+            <a:lstStyle/>
+            <a:p>
+              <a:pPr algn="ctr"/>
+              <a:r>
+                <a:rPr lang="en-US" altLang="zh-CN" dirty="0"/>
+                <a:t>VM4</a:t>
+              </a:r>
+            </a:p>
+            <a:p>
+              <a:pPr algn="ctr"/>
+              <a:r>
+                <a:rPr lang="en-US" altLang="zh-CN" dirty="0" err="1"/>
+                <a:t>FreeRTOS</a:t>
               </a:r>
               <a:endParaRPr lang="zh-CN" altLang="en-US" dirty="0"/>
             </a:p>

</xml_diff>